<commit_message>
M0081MEJA-2367 Remove reference to JDT in the build flow diagram
</commit_message>
<xml_diff>
--- a/ApplicationDeveloperGuide/images/build-flow.pptx
+++ b/ApplicationDeveloperGuide/images/build-flow.pptx
@@ -7225,11 +7225,11 @@
             <a:p>
               <a:pPr algn="ctr"/>
               <a:r>
-                <a:rPr lang="en-FR" sz="1200">
+                <a:rPr lang="en-FR" sz="1200" dirty="0">
                   <a:latin typeface="Source Sans Pro Light" panose="020B0403030403020204" pitchFamily="34" charset="0"/>
                   <a:ea typeface="Source Sans Pro Light" panose="020B0403030403020204" pitchFamily="34" charset="0"/>
                 </a:rPr>
-                <a:t>Java Compiler (JDT)</a:t>
+                <a:t>Java Compiler</a:t>
               </a:r>
             </a:p>
           </p:txBody>
@@ -8114,8 +8114,21 @@
                 <a:ea typeface="Source Sans Pro Light" charset="0"/>
                 <a:cs typeface="Source Sans Pro Light" charset="0"/>
               </a:rPr>
-              <a:t>Managed C / last version 2023 11 16</a:t>
-            </a:r>
+              <a:t>Managed C / last </a:t>
+            </a:r>
+            <a:r>
+              <a:rPr lang="en-US" sz="2800">
+                <a:latin typeface="Source Sans Pro Light" charset="0"/>
+                <a:ea typeface="Source Sans Pro Light" charset="0"/>
+                <a:cs typeface="Source Sans Pro Light" charset="0"/>
+              </a:rPr>
+              <a:t>version 2024 12 24</a:t>
+            </a:r>
+            <a:endParaRPr lang="en-US" sz="2800" dirty="0">
+              <a:latin typeface="Source Sans Pro Light" charset="0"/>
+              <a:ea typeface="Source Sans Pro Light" charset="0"/>
+              <a:cs typeface="Source Sans Pro Light" charset="0"/>
+            </a:endParaRPr>
           </a:p>
         </p:txBody>
       </p:sp>

</xml_diff>

<commit_message>
update executable build flow
synchronize main stream with MKT/Tech build flow  (ABLA core)
</commit_message>
<xml_diff>
--- a/ApplicationDeveloperGuide/images/build-flow.pptx
+++ b/ApplicationDeveloperGuide/images/build-flow.pptx
@@ -239,7 +239,7 @@
               <a:rPr lang="fr-FR" smtClean="0">
                 <a:latin typeface="Calibri Regular" charset="0"/>
               </a:rPr>
-              <a:t>décembre 24</a:t>
+              <a:t>novembre 25</a:t>
             </a:fld>
             <a:endParaRPr lang="en-US" dirty="0">
               <a:latin typeface="Calibri Regular" charset="0"/>
@@ -418,7 +418,7 @@
             <a:fld id="{79958FA1-9FE8-F149-AB4B-7DC9950B39E9}" type="datetime6">
               <a:rPr lang="fr-FR" smtClean="0"/>
               <a:pPr/>
-              <a:t>décembre 24</a:t>
+              <a:t>novembre 25</a:t>
             </a:fld>
             <a:endParaRPr lang="en-US" dirty="0"/>
           </a:p>
@@ -7913,12 +7913,23 @@
             <a:p>
               <a:pPr algn="ctr"/>
               <a:r>
-                <a:rPr lang="en-FR" sz="1200">
+                <a:rPr lang="en-FR" sz="1200" dirty="0">
                   <a:latin typeface="Source Sans Pro Light" panose="020B0403030403020204" pitchFamily="34" charset="0"/>
                   <a:ea typeface="Source Sans Pro Light" panose="020B0403030403020204" pitchFamily="34" charset="0"/>
                 </a:rPr>
                 <a:t>C Compiler</a:t>
               </a:r>
+              <a:r>
+                <a:rPr lang="en-US" sz="1200" dirty="0">
+                  <a:latin typeface="Source Sans Pro Light" panose="020B0403030403020204" pitchFamily="34" charset="0"/>
+                  <a:ea typeface="Source Sans Pro Light" panose="020B0403030403020204" pitchFamily="34" charset="0"/>
+                </a:rPr>
+                <a:t> (WASI SDK)</a:t>
+              </a:r>
+              <a:endParaRPr lang="en-FR" sz="1200" dirty="0">
+                <a:latin typeface="Source Sans Pro Light" panose="020B0403030403020204" pitchFamily="34" charset="0"/>
+                <a:ea typeface="Source Sans Pro Light" panose="020B0403030403020204" pitchFamily="34" charset="0"/>
+              </a:endParaRPr>
             </a:p>
           </p:txBody>
         </p:sp>
@@ -8080,45 +8091,6 @@
           </p:txBody>
         </p:sp>
       </p:grpSp>
-      <p:sp>
-        <p:nvSpPr>
-          <p:cNvPr id="33" name="TextBox 32">
-            <a:extLst>
-              <a:ext uri="{FF2B5EF4-FFF2-40B4-BE49-F238E27FC236}">
-                <a16:creationId xmlns:a16="http://schemas.microsoft.com/office/drawing/2014/main" id="{3ACD6003-E876-154B-8EC5-6865E8200381}"/>
-              </a:ext>
-            </a:extLst>
-          </p:cNvPr>
-          <p:cNvSpPr txBox="1"/>
-          <p:nvPr/>
-        </p:nvSpPr>
-        <p:spPr>
-          <a:xfrm>
-            <a:off x="746942" y="339648"/>
-            <a:ext cx="11826058" cy="523220"/>
-          </a:xfrm>
-          <a:prstGeom prst="rect">
-            <a:avLst/>
-          </a:prstGeom>
-          <a:noFill/>
-        </p:spPr>
-        <p:txBody>
-          <a:bodyPr wrap="square" rtlCol="0">
-            <a:spAutoFit/>
-          </a:bodyPr>
-          <a:lstStyle/>
-          <a:p>
-            <a:r>
-              <a:rPr lang="en-US" sz="2800" dirty="0">
-                <a:latin typeface="Source Sans Pro Light" charset="0"/>
-                <a:ea typeface="Source Sans Pro Light" charset="0"/>
-                <a:cs typeface="Source Sans Pro Light" charset="0"/>
-              </a:rPr>
-              <a:t>Managed C / last version 2023 11 16</a:t>
-            </a:r>
-          </a:p>
-        </p:txBody>
-      </p:sp>
       <p:cxnSp>
         <p:nvCxnSpPr>
           <p:cNvPr id="34" name="Straight Connector 33">

</xml_diff>